<commit_message>
re-wording some stuff on page 2
</commit_message>
<xml_diff>
--- a/jmva_presentation.pptx
+++ b/jmva_presentation.pptx
@@ -203,7 +203,7 @@
           <a:p>
             <a:fld id="{30861119-6150-8F4A-9CB0-3B4B7211A86B}" type="datetimeFigureOut">
               <a:rPr kumimoji="1" lang="zh-CN" altLang="en-US" smtClean="0"/>
-              <a:t>29/10/2012</a:t>
+              <a:t>10/29/12</a:t>
             </a:fld>
             <a:endParaRPr kumimoji="1" lang="zh-CN" altLang="en-US"/>
           </a:p>
@@ -369,7 +369,7 @@
           <a:p>
             <a:fld id="{6BF45CB4-CB45-1A43-B0B0-E388519BCB62}" type="datetimeFigureOut">
               <a:rPr kumimoji="1" lang="zh-CN" altLang="en-US" smtClean="0"/>
-              <a:t>29/10/2012</a:t>
+              <a:t>10/29/12</a:t>
             </a:fld>
             <a:endParaRPr kumimoji="1" lang="zh-CN" altLang="en-US"/>
           </a:p>
@@ -4617,8 +4617,33 @@
                 <a:latin typeface="Monaco"/>
                 <a:cs typeface="Monaco"/>
               </a:rPr>
-              <a:t>Downloading code from SVN and importing into IntelliJ IDEA</a:t>
-            </a:r>
+              <a:t>We downloaded the project </a:t>
+            </a:r>
+            <a:r>
+              <a:rPr lang="en-US" sz="1600" dirty="0" smtClean="0">
+                <a:latin typeface="Monaco"/>
+                <a:cs typeface="Monaco"/>
+              </a:rPr>
+              <a:t>from SVN and </a:t>
+            </a:r>
+            <a:r>
+              <a:rPr lang="en-US" sz="1600" dirty="0" smtClean="0">
+                <a:latin typeface="Monaco"/>
+                <a:cs typeface="Monaco"/>
+              </a:rPr>
+              <a:t>imported it into </a:t>
+            </a:r>
+            <a:r>
+              <a:rPr lang="en-US" sz="1600" dirty="0" err="1" smtClean="0">
+                <a:latin typeface="Monaco"/>
+                <a:cs typeface="Monaco"/>
+              </a:rPr>
+              <a:t>IntelliJ</a:t>
+            </a:r>
+            <a:endParaRPr lang="en-US" sz="1600" dirty="0" smtClean="0">
+              <a:latin typeface="Monaco"/>
+              <a:cs typeface="Monaco"/>
+            </a:endParaRPr>
           </a:p>
           <a:p>
             <a:pPr lvl="1"/>
@@ -4627,7 +4652,21 @@
                 <a:latin typeface="Monaco"/>
                 <a:cs typeface="Monaco"/>
               </a:rPr>
-              <a:t>Fixed encoding issue (UTF-8 </a:t>
+              <a:t>We fixe a text encoding </a:t>
+            </a:r>
+            <a:r>
+              <a:rPr lang="en-US" sz="1600" dirty="0" smtClean="0">
+                <a:latin typeface="Monaco"/>
+                <a:cs typeface="Monaco"/>
+              </a:rPr>
+              <a:t>(</a:t>
+            </a:r>
+            <a:r>
+              <a:rPr lang="en-US" sz="1600" dirty="0" smtClean="0">
+                <a:latin typeface="Monaco"/>
+                <a:cs typeface="Monaco"/>
+              </a:rPr>
+              <a:t>UTF-8 </a:t>
             </a:r>
             <a:r>
               <a:rPr lang="en-US" sz="1600" dirty="0" err="1" smtClean="0">
@@ -4641,8 +4680,19 @@
                 <a:latin typeface="Monaco"/>
                 <a:cs typeface="Monaco"/>
               </a:rPr>
-              <a:t> ISO-8859-1)</a:t>
-            </a:r>
+              <a:t> ISO-8859-1</a:t>
+            </a:r>
+            <a:r>
+              <a:rPr lang="en-US" sz="1600" dirty="0" smtClean="0">
+                <a:latin typeface="Monaco"/>
+                <a:cs typeface="Monaco"/>
+              </a:rPr>
+              <a:t>) in the files.</a:t>
+            </a:r>
+            <a:endParaRPr lang="en-US" sz="1600" dirty="0" smtClean="0">
+              <a:latin typeface="Monaco"/>
+              <a:cs typeface="Monaco"/>
+            </a:endParaRPr>
           </a:p>
           <a:p>
             <a:pPr lvl="1"/>
@@ -4651,7 +4701,7 @@
                 <a:latin typeface="Monaco"/>
                 <a:cs typeface="Monaco"/>
               </a:rPr>
-              <a:t>Found </a:t>
+              <a:t>Next, we  located the </a:t>
             </a:r>
             <a:r>
               <a:rPr lang="en-US" sz="1600" dirty="0" smtClean="0">
@@ -4664,7 +4714,7 @@
               <a:t>main</a:t>
             </a:r>
             <a:r>
-              <a:rPr lang="en-US" sz="1600" dirty="0">
+              <a:rPr lang="en-US" sz="1600" dirty="0" smtClean="0">
                 <a:latin typeface="Monaco"/>
                 <a:cs typeface="Monaco"/>
               </a:rPr>
@@ -4689,8 +4739,33 @@
                 <a:latin typeface="Monaco"/>
                 <a:cs typeface="Monaco"/>
               </a:rPr>
-              <a:t> (3 exist in the code) and ran it to determine relationship between JMT and JMVA</a:t>
-            </a:r>
+              <a:t> </a:t>
+            </a:r>
+            <a:r>
+              <a:rPr lang="en-US" sz="1600" dirty="0" smtClean="0">
+                <a:latin typeface="Monaco"/>
+                <a:cs typeface="Monaco"/>
+              </a:rPr>
+              <a:t>and </a:t>
+            </a:r>
+            <a:r>
+              <a:rPr lang="en-US" sz="1600" dirty="0" smtClean="0">
+                <a:latin typeface="Monaco"/>
+                <a:cs typeface="Monaco"/>
+              </a:rPr>
+              <a:t>ran it to determine relationship between JMT and </a:t>
+            </a:r>
+            <a:r>
+              <a:rPr lang="en-US" sz="1600" dirty="0" smtClean="0">
+                <a:latin typeface="Monaco"/>
+                <a:cs typeface="Monaco"/>
+              </a:rPr>
+              <a:t>JMVA.</a:t>
+            </a:r>
+            <a:endParaRPr lang="en-US" sz="1600" dirty="0" smtClean="0">
+              <a:latin typeface="Monaco"/>
+              <a:cs typeface="Monaco"/>
+            </a:endParaRPr>
           </a:p>
           <a:p>
             <a:pPr lvl="1"/>
@@ -4699,7 +4774,7 @@
                 <a:latin typeface="Monaco"/>
                 <a:cs typeface="Monaco"/>
               </a:rPr>
-              <a:t>Found entry point into JMVA component (</a:t>
+              <a:t>This helped us find the entry point into the JMVA application: the </a:t>
             </a:r>
             <a:r>
               <a:rPr lang="en-US" sz="1600" dirty="0" err="1" smtClean="0">
@@ -4713,8 +4788,12 @@
                 <a:latin typeface="Monaco"/>
                 <a:cs typeface="Monaco"/>
               </a:rPr>
-              <a:t> class)</a:t>
-            </a:r>
+              <a:t> class</a:t>
+            </a:r>
+            <a:endParaRPr lang="en-US" sz="1600" dirty="0" smtClean="0">
+              <a:latin typeface="Monaco"/>
+              <a:cs typeface="Monaco"/>
+            </a:endParaRPr>
           </a:p>
           <a:p>
             <a:pPr lvl="1"/>
@@ -4723,7 +4802,21 @@
                 <a:latin typeface="Monaco"/>
                 <a:cs typeface="Monaco"/>
               </a:rPr>
-              <a:t>Traced execution of button clicks (</a:t>
+              <a:t>We observed how the application behaved by tracing the</a:t>
+            </a:r>
+            <a:r>
+              <a:rPr lang="en-US" sz="1600" dirty="0" smtClean="0">
+                <a:latin typeface="Monaco"/>
+                <a:cs typeface="Monaco"/>
+              </a:rPr>
+              <a:t> </a:t>
+            </a:r>
+            <a:r>
+              <a:rPr lang="en-US" sz="1600" dirty="0" smtClean="0">
+                <a:latin typeface="Monaco"/>
+                <a:cs typeface="Monaco"/>
+              </a:rPr>
+              <a:t>execution of button clicks (</a:t>
             </a:r>
             <a:r>
               <a:rPr lang="en-US" sz="1600" dirty="0" err="1" smtClean="0">
@@ -4748,10 +4841,17 @@
             </a:r>
             <a:r>
               <a:rPr lang="en-US" sz="1600" dirty="0" smtClean="0">
-                <a:latin typeface="Monaco"/>
-                <a:cs typeface="Monaco"/>
-              </a:rPr>
-              <a:t>)</a:t>
+                <a:latin typeface="Courier New"/>
+                <a:cs typeface="Courier New"/>
+              </a:rPr>
+              <a:t> </a:t>
+            </a:r>
+            <a:r>
+              <a:rPr lang="en-US" sz="1600" dirty="0" smtClean="0">
+                <a:latin typeface="Monaco"/>
+                <a:cs typeface="Monaco"/>
+              </a:rPr>
+              <a:t>actions)</a:t>
             </a:r>
             <a:endParaRPr lang="en-US" sz="1600" dirty="0">
               <a:latin typeface="Monaco"/>
@@ -4764,19 +4864,8 @@
                 <a:latin typeface="Monaco"/>
                 <a:cs typeface="Monaco"/>
               </a:rPr>
-              <a:t>Functionality of </a:t>
-            </a:r>
-            <a:r>
-              <a:rPr lang="en-US" sz="2000" dirty="0" smtClean="0">
-                <a:latin typeface="Monaco"/>
-                <a:cs typeface="Monaco"/>
-              </a:rPr>
-              <a:t>JMVA</a:t>
-            </a:r>
-            <a:endParaRPr lang="en-US" sz="2000" dirty="0" smtClean="0">
-              <a:latin typeface="Monaco"/>
-              <a:cs typeface="Monaco"/>
-            </a:endParaRPr>
+              <a:t>Functionality of JMVA</a:t>
+            </a:r>
           </a:p>
           <a:p>
             <a:pPr lvl="1"/>
@@ -4785,21 +4874,7 @@
                 <a:latin typeface="Monaco"/>
                 <a:cs typeface="Monaco"/>
               </a:rPr>
-              <a:t>JMVA </a:t>
-            </a:r>
-            <a:r>
-              <a:rPr lang="en-US" sz="1600" dirty="0" smtClean="0">
-                <a:latin typeface="Monaco"/>
-                <a:cs typeface="Monaco"/>
-              </a:rPr>
-              <a:t>produces solution </a:t>
-            </a:r>
-            <a:r>
-              <a:rPr lang="en-US" sz="1600" dirty="0" smtClean="0">
-                <a:latin typeface="Monaco"/>
-                <a:cs typeface="Monaco"/>
-              </a:rPr>
-              <a:t>to Mean-Value-Analysis problem from queuing theory</a:t>
+              <a:t>JMVA produces solution to Mean-Value-Analysis problem from queuing theory</a:t>
             </a:r>
           </a:p>
           <a:p>
@@ -4809,7 +4884,21 @@
                 <a:latin typeface="Monaco"/>
                 <a:cs typeface="Monaco"/>
               </a:rPr>
-              <a:t>The network model is defined by </a:t>
+              <a:t>The network model is </a:t>
+            </a:r>
+            <a:r>
+              <a:rPr lang="en-US" sz="1600" dirty="0" smtClean="0">
+                <a:latin typeface="Monaco"/>
+                <a:cs typeface="Monaco"/>
+              </a:rPr>
+              <a:t>defined </a:t>
+            </a:r>
+            <a:r>
+              <a:rPr lang="en-US" sz="1600" dirty="0" smtClean="0">
+                <a:latin typeface="Monaco"/>
+                <a:cs typeface="Monaco"/>
+              </a:rPr>
+              <a:t>by </a:t>
             </a:r>
             <a:r>
               <a:rPr lang="en-US" sz="1600" dirty="0" smtClean="0">
@@ -5081,11 +5170,6 @@
               </a:rPr>
               <a:t>Defining a model of queuing network</a:t>
             </a:r>
-            <a:endParaRPr lang="en-US" sz="2000" dirty="0">
-              <a:latin typeface="Monaco"/>
-              <a:ea typeface="+mn-ea"/>
-              <a:cs typeface="Monaco"/>
-            </a:endParaRPr>
           </a:p>
           <a:p>
             <a:pPr lvl="1"/>
@@ -5260,15 +5344,7 @@
                 <a:ea typeface="+mn-ea"/>
                 <a:cs typeface="Monaco"/>
               </a:rPr>
-              <a:t>Model </a:t>
-            </a:r>
-            <a:r>
-              <a:rPr lang="en-US" sz="2000" dirty="0">
-                <a:latin typeface="Monaco"/>
-                <a:ea typeface="+mn-ea"/>
-                <a:cs typeface="Monaco"/>
-              </a:rPr>
-              <a:t>Solution</a:t>
+              <a:t>Model Solution</a:t>
             </a:r>
           </a:p>
           <a:p>
@@ -5354,11 +5430,6 @@
               </a:rPr>
               <a:t> file</a:t>
             </a:r>
-            <a:endParaRPr lang="en-US" sz="2000" dirty="0">
-              <a:latin typeface="Monaco"/>
-              <a:ea typeface="+mn-ea"/>
-              <a:cs typeface="Monaco"/>
-            </a:endParaRPr>
           </a:p>
           <a:p>
             <a:pPr marL="800100" lvl="1" indent="-342900">
@@ -5449,6 +5520,13 @@
   <p:clrMapOvr>
     <a:masterClrMapping/>
   </p:clrMapOvr>
+  <p:timing>
+    <p:tnLst>
+      <p:par>
+        <p:cTn xmlns:p14="http://schemas.microsoft.com/office/powerpoint/2010/main" id="1" dur="indefinite" restart="never" nodeType="tmRoot"/>
+      </p:par>
+    </p:tnLst>
+  </p:timing>
 </p:sld>
 </file>
 
@@ -6609,11 +6687,6 @@
               </a:rPr>
               <a:t>3</a:t>
             </a:r>
-            <a:endParaRPr lang="es-ES" dirty="0">
-              <a:solidFill>
-                <a:srgbClr val="000000"/>
-              </a:solidFill>
-            </a:endParaRPr>
           </a:p>
         </p:txBody>
       </p:sp>
@@ -7910,6 +7983,10 @@
               <a:rPr lang="en-US" sz="1600" dirty="0" smtClean="0"/>
               <a:t>)</a:t>
             </a:r>
+          </a:p>
+          <a:p>
+            <a:pPr lvl="1"/>
+            <a:endParaRPr lang="en-US" sz="1600" dirty="0" smtClean="0"/>
           </a:p>
           <a:p>
             <a:pPr marL="457200" lvl="1" indent="0">

</xml_diff>